<commit_message>
docs(other): fix doc ad add ppt
</commit_message>
<xml_diff>
--- a/docs/项目介绍.pptx
+++ b/docs/项目介绍.pptx
@@ -7,9 +7,25 @@
   <p:sldIdLst>
     <p:sldId id="256" r:id="rId3"/>
     <p:sldId id="257" r:id="rId4"/>
-    <p:sldId id="258" r:id="rId5"/>
-    <p:sldId id="259" r:id="rId6"/>
-    <p:sldId id="260" r:id="rId7"/>
+    <p:sldId id="261" r:id="rId5"/>
+    <p:sldId id="262" r:id="rId6"/>
+    <p:sldId id="264" r:id="rId7"/>
+    <p:sldId id="265" r:id="rId8"/>
+    <p:sldId id="266" r:id="rId9"/>
+    <p:sldId id="267" r:id="rId10"/>
+    <p:sldId id="258" r:id="rId11"/>
+    <p:sldId id="268" r:id="rId12"/>
+    <p:sldId id="269" r:id="rId13"/>
+    <p:sldId id="270" r:id="rId14"/>
+    <p:sldId id="271" r:id="rId15"/>
+    <p:sldId id="259" r:id="rId16"/>
+    <p:sldId id="272" r:id="rId17"/>
+    <p:sldId id="273" r:id="rId18"/>
+    <p:sldId id="274" r:id="rId19"/>
+    <p:sldId id="275" r:id="rId20"/>
+    <p:sldId id="276" r:id="rId21"/>
+    <p:sldId id="277" r:id="rId22"/>
+    <p:sldId id="260" r:id="rId23"/>
   </p:sldIdLst>
   <p:sldSz cx="12192000" cy="6858000"/>
   <p:notesSz cx="6858000" cy="9144000"/>
@@ -2954,20 +2970,413 @@
             <p:ph type="subTitle" idx="1"/>
           </p:nvPr>
         </p:nvSpPr>
+        <p:spPr>
+          <a:xfrm>
+            <a:off x="1524000" y="4240848"/>
+            <a:ext cx="9144000" cy="1655762"/>
+          </a:xfrm>
+        </p:spPr>
+        <p:txBody>
+          <a:bodyPr/>
+          <a:p>
+            <a:r>
+              <a:rPr lang="zh-CN" altLang="en-US" sz="2000"/>
+              <a:t>成员</a:t>
+            </a:r>
+            <a:endParaRPr lang="zh-CN" altLang="en-US" sz="2000"/>
+          </a:p>
+          <a:p>
+            <a:r>
+              <a:rPr lang="zh-CN" altLang="en-US" sz="2000"/>
+              <a:t>熊逸朗</a:t>
+            </a:r>
+            <a:r>
+              <a:rPr lang="en-US" altLang="zh-CN" sz="2000"/>
+              <a:t>, </a:t>
+            </a:r>
+            <a:r>
+              <a:rPr lang="zh-CN" altLang="en-US" sz="2000"/>
+              <a:t>顾璨</a:t>
+            </a:r>
+            <a:r>
+              <a:rPr lang="en-US" altLang="zh-CN" sz="2000"/>
+              <a:t>, </a:t>
+            </a:r>
+            <a:r>
+              <a:rPr lang="zh-CN" altLang="en-US" sz="2000"/>
+              <a:t>崔裕</a:t>
+            </a:r>
+            <a:r>
+              <a:rPr lang="zh-CN" altLang="en-US" sz="2000"/>
+              <a:t>铭</a:t>
+            </a:r>
+            <a:endParaRPr lang="zh-CN" altLang="en-US" sz="2000"/>
+          </a:p>
+        </p:txBody>
+      </p:sp>
+      <p:sp>
+        <p:nvSpPr>
+          <p:cNvPr id="4" name="文本框 3"/>
+          <p:cNvSpPr txBox="1"/>
+          <p:nvPr/>
+        </p:nvSpPr>
+        <p:spPr>
+          <a:xfrm>
+            <a:off x="3651885" y="3331210"/>
+            <a:ext cx="4888230" cy="337185"/>
+          </a:xfrm>
+          <a:prstGeom prst="rect">
+            <a:avLst/>
+          </a:prstGeom>
+          <a:noFill/>
+        </p:spPr>
+        <p:txBody>
+          <a:bodyPr wrap="square" rtlCol="0">
+            <a:spAutoFit/>
+          </a:bodyPr>
+          <a:p>
+            <a:pPr algn="ctr"/>
+            <a:r>
+              <a:rPr lang="zh-CN" altLang="en-US" sz="1600">
+                <a:solidFill>
+                  <a:schemeClr val="bg1">
+                    <a:lumMod val="65000"/>
+                  </a:schemeClr>
+                </a:solidFill>
+              </a:rPr>
+              <a:t>仿照网易云桌面端应用写的音乐播放器</a:t>
+            </a:r>
+            <a:r>
+              <a:rPr lang="en-US" altLang="zh-CN" sz="1600">
+                <a:solidFill>
+                  <a:schemeClr val="bg1">
+                    <a:lumMod val="65000"/>
+                  </a:schemeClr>
+                </a:solidFill>
+              </a:rPr>
+              <a:t>PC</a:t>
+            </a:r>
+            <a:r>
+              <a:rPr lang="zh-CN" altLang="en-US" sz="1600">
+                <a:solidFill>
+                  <a:schemeClr val="bg1">
+                    <a:lumMod val="65000"/>
+                  </a:schemeClr>
+                </a:solidFill>
+              </a:rPr>
+              <a:t>网页</a:t>
+            </a:r>
+            <a:endParaRPr lang="zh-CN" altLang="en-US" sz="1600">
+              <a:solidFill>
+                <a:schemeClr val="bg1">
+                  <a:lumMod val="65000"/>
+                </a:schemeClr>
+              </a:solidFill>
+            </a:endParaRPr>
+          </a:p>
+        </p:txBody>
+      </p:sp>
+    </p:spTree>
+  </p:cSld>
+  <p:clrMapOvr>
+    <a:masterClrMapping/>
+  </p:clrMapOvr>
+</p:sld>
+</file>
+
+<file path=ppt/slides/slide10.xml><?xml version="1.0" encoding="utf-8"?>
+<p:sld xmlns:a="http://schemas.openxmlformats.org/drawingml/2006/main" xmlns:r="http://schemas.openxmlformats.org/officeDocument/2006/relationships" xmlns:p="http://schemas.openxmlformats.org/presentationml/2006/main">
+  <p:cSld>
+    <p:spTree>
+      <p:nvGrpSpPr>
+        <p:cNvPr id="1" name=""/>
+        <p:cNvGrpSpPr/>
+        <p:nvPr/>
+      </p:nvGrpSpPr>
+      <p:grpSpPr/>
+      <p:sp>
+        <p:nvSpPr>
+          <p:cNvPr id="2" name="标题 1"/>
+          <p:cNvSpPr>
+            <a:spLocks noGrp="1"/>
+          </p:cNvSpPr>
+          <p:nvPr>
+            <p:ph type="title"/>
+          </p:nvPr>
+        </p:nvSpPr>
         <p:spPr/>
         <p:txBody>
           <a:bodyPr/>
           <a:p>
             <a:r>
               <a:rPr lang="zh-CN" altLang="en-US"/>
-              <a:t>成员</a:t>
-            </a:r>
-            <a:endParaRPr lang="zh-CN" altLang="en-US"/>
-          </a:p>
-          <a:p>
+              <a:t>技术</a:t>
+            </a:r>
             <a:r>
               <a:rPr lang="zh-CN" altLang="en-US"/>
-              <a:t>熊逸朗</a:t>
+              <a:t>选型</a:t>
+            </a:r>
+            <a:endParaRPr lang="zh-CN" altLang="en-US"/>
+          </a:p>
+        </p:txBody>
+      </p:sp>
+      <p:pic>
+        <p:nvPicPr>
+          <p:cNvPr id="4" name="图片 3"/>
+          <p:cNvPicPr>
+            <a:picLocks noChangeAspect="1"/>
+          </p:cNvPicPr>
+          <p:nvPr/>
+        </p:nvPicPr>
+        <p:blipFill>
+          <a:blip r:embed="rId1"/>
+          <a:stretch>
+            <a:fillRect/>
+          </a:stretch>
+        </p:blipFill>
+        <p:spPr>
+          <a:xfrm>
+            <a:off x="8409940" y="5198110"/>
+            <a:ext cx="3284220" cy="1127760"/>
+          </a:xfrm>
+          <a:prstGeom prst="rect">
+            <a:avLst/>
+          </a:prstGeom>
+        </p:spPr>
+      </p:pic>
+      <p:pic>
+        <p:nvPicPr>
+          <p:cNvPr id="5" name="图片 4"/>
+          <p:cNvPicPr>
+            <a:picLocks noChangeAspect="1"/>
+          </p:cNvPicPr>
+          <p:nvPr/>
+        </p:nvPicPr>
+        <p:blipFill>
+          <a:blip r:embed="rId2"/>
+          <a:stretch>
+            <a:fillRect/>
+          </a:stretch>
+        </p:blipFill>
+        <p:spPr>
+          <a:xfrm>
+            <a:off x="4260215" y="1162050"/>
+            <a:ext cx="3063240" cy="1615440"/>
+          </a:xfrm>
+          <a:prstGeom prst="rect">
+            <a:avLst/>
+          </a:prstGeom>
+        </p:spPr>
+      </p:pic>
+      <p:pic>
+        <p:nvPicPr>
+          <p:cNvPr id="6" name="图片 5"/>
+          <p:cNvPicPr>
+            <a:picLocks noChangeAspect="1"/>
+          </p:cNvPicPr>
+          <p:nvPr/>
+        </p:nvPicPr>
+        <p:blipFill>
+          <a:blip r:embed="rId3"/>
+          <a:stretch>
+            <a:fillRect/>
+          </a:stretch>
+        </p:blipFill>
+        <p:spPr>
+          <a:xfrm>
+            <a:off x="1373505" y="2912745"/>
+            <a:ext cx="4373880" cy="1920240"/>
+          </a:xfrm>
+          <a:prstGeom prst="rect">
+            <a:avLst/>
+          </a:prstGeom>
+        </p:spPr>
+      </p:pic>
+      <p:pic>
+        <p:nvPicPr>
+          <p:cNvPr id="7" name="图片 6"/>
+          <p:cNvPicPr>
+            <a:picLocks noChangeAspect="1"/>
+          </p:cNvPicPr>
+          <p:nvPr/>
+        </p:nvPicPr>
+        <p:blipFill>
+          <a:blip r:embed="rId4"/>
+          <a:stretch>
+            <a:fillRect/>
+          </a:stretch>
+        </p:blipFill>
+        <p:spPr>
+          <a:xfrm>
+            <a:off x="5946775" y="2658110"/>
+            <a:ext cx="4701540" cy="2033905"/>
+          </a:xfrm>
+          <a:prstGeom prst="rect">
+            <a:avLst/>
+          </a:prstGeom>
+        </p:spPr>
+      </p:pic>
+      <p:pic>
+        <p:nvPicPr>
+          <p:cNvPr id="8" name="图片 7"/>
+          <p:cNvPicPr>
+            <a:picLocks noChangeAspect="1"/>
+          </p:cNvPicPr>
+          <p:nvPr/>
+        </p:nvPicPr>
+        <p:blipFill>
+          <a:blip r:embed="rId5"/>
+          <a:stretch>
+            <a:fillRect/>
+          </a:stretch>
+        </p:blipFill>
+        <p:spPr>
+          <a:xfrm>
+            <a:off x="471805" y="1917065"/>
+            <a:ext cx="2924175" cy="1139190"/>
+          </a:xfrm>
+          <a:prstGeom prst="rect">
+            <a:avLst/>
+          </a:prstGeom>
+        </p:spPr>
+      </p:pic>
+      <p:pic>
+        <p:nvPicPr>
+          <p:cNvPr id="9" name="图片 8"/>
+          <p:cNvPicPr>
+            <a:picLocks noChangeAspect="1"/>
+          </p:cNvPicPr>
+          <p:nvPr/>
+        </p:nvPicPr>
+        <p:blipFill>
+          <a:blip r:embed="rId6"/>
+          <a:stretch>
+            <a:fillRect/>
+          </a:stretch>
+        </p:blipFill>
+        <p:spPr>
+          <a:xfrm>
+            <a:off x="960120" y="4968240"/>
+            <a:ext cx="1946910" cy="857885"/>
+          </a:xfrm>
+          <a:prstGeom prst="rect">
+            <a:avLst/>
+          </a:prstGeom>
+        </p:spPr>
+      </p:pic>
+      <p:pic>
+        <p:nvPicPr>
+          <p:cNvPr id="10" name="图片 9"/>
+          <p:cNvPicPr>
+            <a:picLocks noChangeAspect="1"/>
+          </p:cNvPicPr>
+          <p:nvPr/>
+        </p:nvPicPr>
+        <p:blipFill>
+          <a:blip r:embed="rId7"/>
+          <a:stretch>
+            <a:fillRect/>
+          </a:stretch>
+        </p:blipFill>
+        <p:spPr>
+          <a:xfrm>
+            <a:off x="8267700" y="1340485"/>
+            <a:ext cx="2796540" cy="647700"/>
+          </a:xfrm>
+          <a:prstGeom prst="rect">
+            <a:avLst/>
+          </a:prstGeom>
+        </p:spPr>
+      </p:pic>
+    </p:spTree>
+  </p:cSld>
+  <p:clrMapOvr>
+    <a:masterClrMapping/>
+  </p:clrMapOvr>
+</p:sld>
+</file>
+
+<file path=ppt/slides/slide11.xml><?xml version="1.0" encoding="utf-8"?>
+<p:sld xmlns:a="http://schemas.openxmlformats.org/drawingml/2006/main" xmlns:r="http://schemas.openxmlformats.org/officeDocument/2006/relationships" xmlns:p="http://schemas.openxmlformats.org/presentationml/2006/main">
+  <p:cSld>
+    <p:spTree>
+      <p:nvGrpSpPr>
+        <p:cNvPr id="1" name=""/>
+        <p:cNvGrpSpPr/>
+        <p:nvPr/>
+      </p:nvGrpSpPr>
+      <p:grpSpPr/>
+      <p:sp>
+        <p:nvSpPr>
+          <p:cNvPr id="2" name="标题 1"/>
+          <p:cNvSpPr>
+            <a:spLocks noGrp="1"/>
+          </p:cNvSpPr>
+          <p:nvPr>
+            <p:ph type="title"/>
+          </p:nvPr>
+        </p:nvSpPr>
+        <p:spPr/>
+        <p:txBody>
+          <a:bodyPr/>
+          <a:p>
+            <a:r>
+              <a:rPr lang="zh-CN" altLang="en-US"/>
+              <a:t>工作流</a:t>
+            </a:r>
+            <a:endParaRPr lang="zh-CN" altLang="en-US"/>
+          </a:p>
+        </p:txBody>
+      </p:sp>
+      <p:pic>
+        <p:nvPicPr>
+          <p:cNvPr id="3" name="图片 2"/>
+          <p:cNvPicPr>
+            <a:picLocks noChangeAspect="1"/>
+          </p:cNvPicPr>
+          <p:nvPr/>
+        </p:nvPicPr>
+        <p:blipFill>
+          <a:blip r:embed="rId1"/>
+          <a:stretch>
+            <a:fillRect/>
+          </a:stretch>
+        </p:blipFill>
+        <p:spPr>
+          <a:xfrm>
+            <a:off x="2039620" y="1691005"/>
+            <a:ext cx="8112125" cy="3686175"/>
+          </a:xfrm>
+          <a:prstGeom prst="rect">
+            <a:avLst/>
+          </a:prstGeom>
+        </p:spPr>
+      </p:pic>
+      <p:sp>
+        <p:nvSpPr>
+          <p:cNvPr id="10" name="文本框 9"/>
+          <p:cNvSpPr txBox="1"/>
+          <p:nvPr/>
+        </p:nvSpPr>
+        <p:spPr>
+          <a:xfrm>
+            <a:off x="938530" y="5908040"/>
+            <a:ext cx="10315575" cy="368300"/>
+          </a:xfrm>
+          <a:prstGeom prst="rect">
+            <a:avLst/>
+          </a:prstGeom>
+          <a:noFill/>
+        </p:spPr>
+        <p:txBody>
+          <a:bodyPr wrap="square" rtlCol="0">
+            <a:spAutoFit/>
+          </a:bodyPr>
+          <a:p>
+            <a:pPr algn="ctr"/>
+            <a:r>
+              <a:rPr lang="zh-CN" altLang="en-US"/>
+              <a:t>多分支协作开发</a:t>
             </a:r>
             <a:r>
               <a:rPr lang="en-US" altLang="zh-CN"/>
@@ -2975,7 +3384,15 @@
             </a:r>
             <a:r>
               <a:rPr lang="zh-CN" altLang="en-US"/>
-              <a:t>顾璨</a:t>
+              <a:t>统一在</a:t>
+            </a:r>
+            <a:r>
+              <a:rPr lang="en-US" altLang="zh-CN"/>
+              <a:t> dev </a:t>
+            </a:r>
+            <a:r>
+              <a:rPr lang="zh-CN" altLang="en-US"/>
+              <a:t>上开发</a:t>
             </a:r>
             <a:r>
               <a:rPr lang="en-US" altLang="zh-CN"/>
@@ -2983,16 +3400,1169 @@
             </a:r>
             <a:r>
               <a:rPr lang="zh-CN" altLang="en-US"/>
-              <a:t>崔裕</a:t>
+              <a:t>每个</a:t>
+            </a:r>
+            <a:r>
+              <a:rPr lang="en-US" altLang="zh-CN"/>
+              <a:t> feat/bug </a:t>
             </a:r>
             <a:r>
               <a:rPr lang="zh-CN" altLang="en-US"/>
-              <a:t>铭</a:t>
-            </a:r>
-            <a:endParaRPr lang="zh-CN" altLang="en-US"/>
-          </a:p>
-        </p:txBody>
-      </p:sp>
+              <a:t>额外开分支</a:t>
+            </a:r>
+            <a:r>
+              <a:rPr lang="zh-CN" altLang="en-US"/>
+              <a:t>解决</a:t>
+            </a:r>
+            <a:endParaRPr lang="zh-CN" altLang="en-US"/>
+          </a:p>
+        </p:txBody>
+      </p:sp>
+    </p:spTree>
+  </p:cSld>
+  <p:clrMapOvr>
+    <a:masterClrMapping/>
+  </p:clrMapOvr>
+</p:sld>
+</file>
+
+<file path=ppt/slides/slide12.xml><?xml version="1.0" encoding="utf-8"?>
+<p:sld xmlns:a="http://schemas.openxmlformats.org/drawingml/2006/main" xmlns:r="http://schemas.openxmlformats.org/officeDocument/2006/relationships" xmlns:p="http://schemas.openxmlformats.org/presentationml/2006/main">
+  <p:cSld>
+    <p:spTree>
+      <p:nvGrpSpPr>
+        <p:cNvPr id="1" name=""/>
+        <p:cNvGrpSpPr/>
+        <p:nvPr/>
+      </p:nvGrpSpPr>
+      <p:grpSpPr/>
+      <p:sp>
+        <p:nvSpPr>
+          <p:cNvPr id="2" name="标题 1"/>
+          <p:cNvSpPr>
+            <a:spLocks noGrp="1"/>
+          </p:cNvSpPr>
+          <p:nvPr>
+            <p:ph type="title"/>
+          </p:nvPr>
+        </p:nvSpPr>
+        <p:spPr/>
+        <p:txBody>
+          <a:bodyPr/>
+          <a:p>
+            <a:r>
+              <a:rPr lang="zh-CN" altLang="en-US"/>
+              <a:t>文件</a:t>
+            </a:r>
+            <a:r>
+              <a:rPr lang="zh-CN" altLang="en-US"/>
+              <a:t>结构</a:t>
+            </a:r>
+            <a:endParaRPr lang="zh-CN" altLang="en-US"/>
+          </a:p>
+        </p:txBody>
+      </p:sp>
+      <p:pic>
+        <p:nvPicPr>
+          <p:cNvPr id="4" name="图片 3"/>
+          <p:cNvPicPr>
+            <a:picLocks noChangeAspect="1"/>
+          </p:cNvPicPr>
+          <p:nvPr/>
+        </p:nvPicPr>
+        <p:blipFill>
+          <a:blip r:embed="rId1"/>
+          <a:stretch>
+            <a:fillRect/>
+          </a:stretch>
+        </p:blipFill>
+        <p:spPr>
+          <a:xfrm>
+            <a:off x="2832100" y="1515745"/>
+            <a:ext cx="6245225" cy="3000375"/>
+          </a:xfrm>
+          <a:prstGeom prst="rect">
+            <a:avLst/>
+          </a:prstGeom>
+        </p:spPr>
+      </p:pic>
+      <p:pic>
+        <p:nvPicPr>
+          <p:cNvPr id="5" name="图片 4"/>
+          <p:cNvPicPr>
+            <a:picLocks noChangeAspect="1"/>
+          </p:cNvPicPr>
+          <p:nvPr/>
+        </p:nvPicPr>
+        <p:blipFill>
+          <a:blip r:embed="rId2"/>
+          <a:stretch>
+            <a:fillRect/>
+          </a:stretch>
+        </p:blipFill>
+        <p:spPr>
+          <a:xfrm>
+            <a:off x="2251710" y="4640580"/>
+            <a:ext cx="7406640" cy="1790700"/>
+          </a:xfrm>
+          <a:prstGeom prst="rect">
+            <a:avLst/>
+          </a:prstGeom>
+        </p:spPr>
+      </p:pic>
+    </p:spTree>
+  </p:cSld>
+  <p:clrMapOvr>
+    <a:masterClrMapping/>
+  </p:clrMapOvr>
+</p:sld>
+</file>
+
+<file path=ppt/slides/slide13.xml><?xml version="1.0" encoding="utf-8"?>
+<p:sld xmlns:a="http://schemas.openxmlformats.org/drawingml/2006/main" xmlns:r="http://schemas.openxmlformats.org/officeDocument/2006/relationships" xmlns:p="http://schemas.openxmlformats.org/presentationml/2006/main">
+  <p:cSld>
+    <p:spTree>
+      <p:nvGrpSpPr>
+        <p:cNvPr id="1" name=""/>
+        <p:cNvGrpSpPr/>
+        <p:nvPr/>
+      </p:nvGrpSpPr>
+      <p:grpSpPr/>
+      <p:sp>
+        <p:nvSpPr>
+          <p:cNvPr id="2" name="标题 1"/>
+          <p:cNvSpPr>
+            <a:spLocks noGrp="1"/>
+          </p:cNvSpPr>
+          <p:nvPr>
+            <p:ph type="title"/>
+          </p:nvPr>
+        </p:nvSpPr>
+        <p:spPr/>
+        <p:txBody>
+          <a:bodyPr/>
+          <a:p>
+            <a:r>
+              <a:rPr lang="zh-CN" altLang="en-US">
+                <a:hlinkClick r:id="rId1" tooltip="" action="ppaction://hlinkfile"/>
+              </a:rPr>
+              <a:t>文档</a:t>
+            </a:r>
+            <a:endParaRPr lang="zh-CN" altLang="en-US"/>
+          </a:p>
+        </p:txBody>
+      </p:sp>
+      <p:pic>
+        <p:nvPicPr>
+          <p:cNvPr id="3" name="图片 2"/>
+          <p:cNvPicPr>
+            <a:picLocks noChangeAspect="1"/>
+          </p:cNvPicPr>
+          <p:nvPr/>
+        </p:nvPicPr>
+        <p:blipFill>
+          <a:blip r:embed="rId2"/>
+          <a:stretch>
+            <a:fillRect/>
+          </a:stretch>
+        </p:blipFill>
+        <p:spPr>
+          <a:xfrm>
+            <a:off x="3139440" y="812800"/>
+            <a:ext cx="8508365" cy="5358130"/>
+          </a:xfrm>
+          <a:prstGeom prst="rect">
+            <a:avLst/>
+          </a:prstGeom>
+        </p:spPr>
+      </p:pic>
+    </p:spTree>
+  </p:cSld>
+  <p:clrMapOvr>
+    <a:masterClrMapping/>
+  </p:clrMapOvr>
+</p:sld>
+</file>
+
+<file path=ppt/slides/slide14.xml><?xml version="1.0" encoding="utf-8"?>
+<p:sld xmlns:a="http://schemas.openxmlformats.org/drawingml/2006/main" xmlns:r="http://schemas.openxmlformats.org/officeDocument/2006/relationships" xmlns:p="http://schemas.openxmlformats.org/presentationml/2006/main">
+  <p:cSld>
+    <p:spTree>
+      <p:nvGrpSpPr>
+        <p:cNvPr id="1" name=""/>
+        <p:cNvGrpSpPr/>
+        <p:nvPr/>
+      </p:nvGrpSpPr>
+      <p:grpSpPr/>
+      <p:sp>
+        <p:nvSpPr>
+          <p:cNvPr id="2" name="标题 1"/>
+          <p:cNvSpPr>
+            <a:spLocks noGrp="1"/>
+          </p:cNvSpPr>
+          <p:nvPr>
+            <p:ph type="ctrTitle"/>
+          </p:nvPr>
+        </p:nvSpPr>
+        <p:spPr/>
+        <p:txBody>
+          <a:bodyPr/>
+          <a:p>
+            <a:r>
+              <a:rPr lang="zh-CN" altLang="en-US"/>
+              <a:t>技术</a:t>
+            </a:r>
+            <a:r>
+              <a:rPr lang="zh-CN" altLang="en-US"/>
+              <a:t>亮点及</a:t>
+            </a:r>
+            <a:r>
+              <a:rPr lang="zh-CN" altLang="en-US"/>
+              <a:t>分工</a:t>
+            </a:r>
+            <a:endParaRPr lang="zh-CN" altLang="en-US"/>
+          </a:p>
+        </p:txBody>
+      </p:sp>
+    </p:spTree>
+  </p:cSld>
+  <p:clrMapOvr>
+    <a:masterClrMapping/>
+  </p:clrMapOvr>
+</p:sld>
+</file>
+
+<file path=ppt/slides/slide15.xml><?xml version="1.0" encoding="utf-8"?>
+<p:sld xmlns:a="http://schemas.openxmlformats.org/drawingml/2006/main" xmlns:r="http://schemas.openxmlformats.org/officeDocument/2006/relationships" xmlns:p="http://schemas.openxmlformats.org/presentationml/2006/main">
+  <p:cSld>
+    <p:spTree>
+      <p:nvGrpSpPr>
+        <p:cNvPr id="1" name=""/>
+        <p:cNvGrpSpPr/>
+        <p:nvPr/>
+      </p:nvGrpSpPr>
+      <p:grpSpPr/>
+      <p:sp>
+        <p:nvSpPr>
+          <p:cNvPr id="2" name="标题 1"/>
+          <p:cNvSpPr>
+            <a:spLocks noGrp="1"/>
+          </p:cNvSpPr>
+          <p:nvPr>
+            <p:ph type="title"/>
+          </p:nvPr>
+        </p:nvSpPr>
+        <p:spPr>
+          <a:xfrm>
+            <a:off x="321310" y="283845"/>
+            <a:ext cx="10515600" cy="779145"/>
+          </a:xfrm>
+        </p:spPr>
+        <p:txBody>
+          <a:bodyPr/>
+          <a:p>
+            <a:r>
+              <a:rPr lang="zh-CN" altLang="en-US" sz="3600"/>
+              <a:t>文档和</a:t>
+            </a:r>
+            <a:r>
+              <a:rPr lang="zh-CN" altLang="en-US" sz="3600"/>
+              <a:t>架构</a:t>
+            </a:r>
+            <a:r>
+              <a:rPr lang="en-US" altLang="zh-CN" sz="1600"/>
+              <a:t>@</a:t>
+            </a:r>
+            <a:r>
+              <a:rPr lang="zh-CN" altLang="en-US" sz="1600"/>
+              <a:t>熊逸朗</a:t>
+            </a:r>
+            <a:endParaRPr lang="zh-CN" altLang="en-US" sz="1600"/>
+          </a:p>
+        </p:txBody>
+      </p:sp>
+      <p:sp>
+        <p:nvSpPr>
+          <p:cNvPr id="5" name="文本框 4"/>
+          <p:cNvSpPr txBox="1"/>
+          <p:nvPr/>
+        </p:nvSpPr>
+        <p:spPr>
+          <a:xfrm>
+            <a:off x="807085" y="1404620"/>
+            <a:ext cx="10578465" cy="398780"/>
+          </a:xfrm>
+          <a:prstGeom prst="rect">
+            <a:avLst/>
+          </a:prstGeom>
+          <a:noFill/>
+        </p:spPr>
+        <p:txBody>
+          <a:bodyPr wrap="square" rtlCol="0">
+            <a:spAutoFit/>
+          </a:bodyPr>
+          <a:p>
+            <a:r>
+              <a:rPr lang="en-US" altLang="zh-CN" sz="2000"/>
+              <a:t>1. </a:t>
+            </a:r>
+            <a:r>
+              <a:rPr lang="zh-CN" altLang="en-US" sz="2000"/>
+              <a:t>项目文档和</a:t>
+            </a:r>
+            <a:r>
+              <a:rPr lang="zh-CN" altLang="en-US" sz="2000">
+                <a:sym typeface="+mn-ea"/>
+              </a:rPr>
+              <a:t>总结构由</a:t>
+            </a:r>
+            <a:r>
+              <a:rPr lang="en-US" altLang="zh-CN" sz="2000">
+                <a:sym typeface="+mn-ea"/>
+              </a:rPr>
+              <a:t>@</a:t>
+            </a:r>
+            <a:r>
+              <a:rPr lang="zh-CN" altLang="en-US" sz="2000">
+                <a:sym typeface="+mn-ea"/>
+              </a:rPr>
+              <a:t>熊逸朗完成</a:t>
+            </a:r>
+            <a:endParaRPr lang="zh-CN" altLang="en-US" sz="2000">
+              <a:sym typeface="+mn-ea"/>
+            </a:endParaRPr>
+          </a:p>
+        </p:txBody>
+      </p:sp>
+      <p:sp>
+        <p:nvSpPr>
+          <p:cNvPr id="7" name="标题 1"/>
+          <p:cNvSpPr>
+            <a:spLocks noGrp="1"/>
+          </p:cNvSpPr>
+          <p:nvPr/>
+        </p:nvSpPr>
+        <p:spPr>
+          <a:xfrm>
+            <a:off x="321310" y="2256790"/>
+            <a:ext cx="10515600" cy="779145"/>
+          </a:xfrm>
+          <a:prstGeom prst="rect">
+            <a:avLst/>
+          </a:prstGeom>
+        </p:spPr>
+        <p:txBody>
+          <a:bodyPr vert="horz" lIns="91440" tIns="45720" rIns="91440" bIns="45720" rtlCol="0" anchor="ctr">
+            <a:normAutofit/>
+          </a:bodyPr>
+          <a:lstStyle>
+            <a:lvl1pPr algn="l" defTabSz="914400" rtl="0" eaLnBrk="1" latinLnBrk="0" hangingPunct="1">
+              <a:lnSpc>
+                <a:spcPct val="90000"/>
+              </a:lnSpc>
+              <a:spcBef>
+                <a:spcPct val="0"/>
+              </a:spcBef>
+              <a:buNone/>
+              <a:defRPr sz="4400" kern="1200">
+                <a:solidFill>
+                  <a:schemeClr val="tx1"/>
+                </a:solidFill>
+                <a:latin typeface="+mj-lt"/>
+                <a:ea typeface="+mj-ea"/>
+                <a:cs typeface="+mj-cs"/>
+              </a:defRPr>
+            </a:lvl1pPr>
+          </a:lstStyle>
+          <a:p>
+            <a:r>
+              <a:rPr lang="zh-CN" altLang="en-US" sz="3600"/>
+              <a:t>部署</a:t>
+            </a:r>
+            <a:r>
+              <a:rPr lang="en-US" altLang="zh-CN" sz="1600"/>
+              <a:t>@</a:t>
+            </a:r>
+            <a:r>
+              <a:rPr lang="zh-CN" altLang="en-US" sz="1600"/>
+              <a:t>熊逸朗</a:t>
+            </a:r>
+            <a:endParaRPr lang="zh-CN" altLang="en-US" sz="1600"/>
+          </a:p>
+        </p:txBody>
+      </p:sp>
+      <p:sp>
+        <p:nvSpPr>
+          <p:cNvPr id="8" name="文本框 7"/>
+          <p:cNvSpPr txBox="1"/>
+          <p:nvPr/>
+        </p:nvSpPr>
+        <p:spPr>
+          <a:xfrm>
+            <a:off x="873125" y="3229610"/>
+            <a:ext cx="10578465" cy="398780"/>
+          </a:xfrm>
+          <a:prstGeom prst="rect">
+            <a:avLst/>
+          </a:prstGeom>
+          <a:noFill/>
+        </p:spPr>
+        <p:txBody>
+          <a:bodyPr wrap="square" rtlCol="0">
+            <a:spAutoFit/>
+          </a:bodyPr>
+          <a:p>
+            <a:r>
+              <a:rPr lang="en-US" altLang="zh-CN" sz="2000"/>
+              <a:t>1.</a:t>
+            </a:r>
+            <a:r>
+              <a:rPr lang="zh-CN" altLang="en-US" sz="2000">
+                <a:sym typeface="+mn-ea"/>
+              </a:rPr>
+              <a:t>通过</a:t>
+            </a:r>
+            <a:r>
+              <a:rPr lang="en-US" altLang="zh-CN" sz="2000">
+                <a:sym typeface="+mn-ea"/>
+              </a:rPr>
+              <a:t> nginx</a:t>
+            </a:r>
+            <a:r>
+              <a:rPr lang="en-US" altLang="zh-CN" sz="2000"/>
+              <a:t> </a:t>
+            </a:r>
+            <a:r>
+              <a:rPr lang="zh-CN" altLang="en-US" sz="2000"/>
+              <a:t>部署到我的个人服务器</a:t>
+            </a:r>
+            <a:r>
+              <a:rPr lang="zh-CN" altLang="en-US" sz="2000"/>
+              <a:t>上</a:t>
+            </a:r>
+            <a:endParaRPr lang="zh-CN" altLang="en-US" sz="2000"/>
+          </a:p>
+        </p:txBody>
+      </p:sp>
+      <p:pic>
+        <p:nvPicPr>
+          <p:cNvPr id="9" name="图片 8"/>
+          <p:cNvPicPr>
+            <a:picLocks noChangeAspect="1"/>
+          </p:cNvPicPr>
+          <p:nvPr/>
+        </p:nvPicPr>
+        <p:blipFill>
+          <a:blip r:embed="rId1"/>
+          <a:stretch>
+            <a:fillRect/>
+          </a:stretch>
+        </p:blipFill>
+        <p:spPr>
+          <a:xfrm>
+            <a:off x="6650990" y="3035935"/>
+            <a:ext cx="4102100" cy="3281680"/>
+          </a:xfrm>
+          <a:prstGeom prst="rect">
+            <a:avLst/>
+          </a:prstGeom>
+        </p:spPr>
+      </p:pic>
+    </p:spTree>
+  </p:cSld>
+  <p:clrMapOvr>
+    <a:masterClrMapping/>
+  </p:clrMapOvr>
+</p:sld>
+</file>
+
+<file path=ppt/slides/slide16.xml><?xml version="1.0" encoding="utf-8"?>
+<p:sld xmlns:a="http://schemas.openxmlformats.org/drawingml/2006/main" xmlns:r="http://schemas.openxmlformats.org/officeDocument/2006/relationships" xmlns:p="http://schemas.openxmlformats.org/presentationml/2006/main">
+  <p:cSld>
+    <p:spTree>
+      <p:nvGrpSpPr>
+        <p:cNvPr id="1" name=""/>
+        <p:cNvGrpSpPr/>
+        <p:nvPr/>
+      </p:nvGrpSpPr>
+      <p:grpSpPr/>
+      <p:sp>
+        <p:nvSpPr>
+          <p:cNvPr id="2" name="标题 1"/>
+          <p:cNvSpPr>
+            <a:spLocks noGrp="1"/>
+          </p:cNvSpPr>
+          <p:nvPr>
+            <p:ph type="title"/>
+          </p:nvPr>
+        </p:nvSpPr>
+        <p:spPr>
+          <a:xfrm>
+            <a:off x="321310" y="283845"/>
+            <a:ext cx="10515600" cy="779145"/>
+          </a:xfrm>
+        </p:spPr>
+        <p:txBody>
+          <a:bodyPr/>
+          <a:p>
+            <a:r>
+              <a:rPr lang="zh-CN" altLang="en-US" sz="3600"/>
+              <a:t>音乐播放</a:t>
+            </a:r>
+            <a:r>
+              <a:rPr lang="en-US" altLang="zh-CN" sz="1600"/>
+              <a:t>@</a:t>
+            </a:r>
+            <a:r>
+              <a:rPr lang="zh-CN" altLang="en-US" sz="1600"/>
+              <a:t>熊逸朗</a:t>
+            </a:r>
+            <a:endParaRPr lang="zh-CN" altLang="en-US" sz="1600"/>
+          </a:p>
+        </p:txBody>
+      </p:sp>
+      <p:pic>
+        <p:nvPicPr>
+          <p:cNvPr id="4" name="图片 3"/>
+          <p:cNvPicPr>
+            <a:picLocks noChangeAspect="1"/>
+          </p:cNvPicPr>
+          <p:nvPr/>
+        </p:nvPicPr>
+        <p:blipFill>
+          <a:blip r:embed="rId1"/>
+          <a:stretch>
+            <a:fillRect/>
+          </a:stretch>
+        </p:blipFill>
+        <p:spPr>
+          <a:xfrm>
+            <a:off x="1858010" y="1127760"/>
+            <a:ext cx="8475980" cy="3973195"/>
+          </a:xfrm>
+          <a:prstGeom prst="rect">
+            <a:avLst/>
+          </a:prstGeom>
+        </p:spPr>
+      </p:pic>
+      <p:sp>
+        <p:nvSpPr>
+          <p:cNvPr id="5" name="文本框 4"/>
+          <p:cNvSpPr txBox="1"/>
+          <p:nvPr/>
+        </p:nvSpPr>
+        <p:spPr>
+          <a:xfrm>
+            <a:off x="810895" y="5482590"/>
+            <a:ext cx="10578465" cy="1076325"/>
+          </a:xfrm>
+          <a:prstGeom prst="rect">
+            <a:avLst/>
+          </a:prstGeom>
+          <a:noFill/>
+        </p:spPr>
+        <p:txBody>
+          <a:bodyPr wrap="square" rtlCol="0">
+            <a:spAutoFit/>
+          </a:bodyPr>
+          <a:p>
+            <a:r>
+              <a:rPr lang="en-US" altLang="zh-CN" sz="1600"/>
+              <a:t>1. </a:t>
+            </a:r>
+            <a:r>
+              <a:rPr lang="zh-CN" altLang="en-US" sz="1600"/>
+              <a:t>提取主色采用</a:t>
+            </a:r>
+            <a:r>
+              <a:rPr lang="en-US" altLang="zh-CN" sz="1600"/>
+              <a:t>canvas</a:t>
+            </a:r>
+            <a:r>
+              <a:rPr lang="zh-CN" altLang="en-US" sz="1600"/>
+              <a:t>对像素进行处理</a:t>
+            </a:r>
+            <a:r>
+              <a:rPr lang="en-US" altLang="zh-CN" sz="1600"/>
+              <a:t>, </a:t>
+            </a:r>
+            <a:r>
+              <a:rPr lang="zh-CN" altLang="en-US" sz="1600"/>
+              <a:t>使用八叉树算法获取其主色</a:t>
+            </a:r>
+            <a:r>
+              <a:rPr lang="en-US" altLang="zh-CN" sz="1600"/>
+              <a:t>. </a:t>
+            </a:r>
+            <a:r>
+              <a:rPr lang="zh-CN" altLang="en-US" sz="1600"/>
+              <a:t>此外我将此算法写成了</a:t>
+            </a:r>
+            <a:r>
+              <a:rPr lang="en-US" altLang="zh-CN" sz="1600"/>
+              <a:t> </a:t>
+            </a:r>
+            <a:r>
+              <a:rPr lang="en-US" altLang="zh-CN" sz="1600">
+                <a:hlinkClick r:id="rId2" action="ppaction://hlinkfile"/>
+              </a:rPr>
+              <a:t>npm </a:t>
+            </a:r>
+            <a:r>
+              <a:rPr lang="zh-CN" altLang="en-US" sz="1600">
+                <a:hlinkClick r:id="rId2" action="ppaction://hlinkfile"/>
+              </a:rPr>
+              <a:t>包</a:t>
+            </a:r>
+            <a:r>
+              <a:rPr lang="zh-CN" altLang="en-US" sz="1600"/>
+              <a:t>发布</a:t>
+            </a:r>
+            <a:r>
+              <a:rPr lang="en-US" altLang="zh-CN" sz="1600"/>
+              <a:t>, </a:t>
+            </a:r>
+            <a:r>
+              <a:rPr lang="zh-CN" altLang="en-US" sz="1600"/>
+              <a:t>本项目使用的就是我写的包</a:t>
+            </a:r>
+            <a:endParaRPr lang="zh-CN" altLang="en-US" sz="1600"/>
+          </a:p>
+          <a:p>
+            <a:r>
+              <a:rPr lang="en-US" altLang="zh-CN" sz="1600">
+                <a:sym typeface="+mn-ea"/>
+              </a:rPr>
+              <a:t>2. </a:t>
+            </a:r>
+            <a:r>
+              <a:rPr lang="zh-CN" altLang="en-US" sz="1600">
+                <a:sym typeface="+mn-ea"/>
+              </a:rPr>
+              <a:t>播放的歌单</a:t>
+            </a:r>
+            <a:r>
+              <a:rPr lang="en-US" altLang="zh-CN" sz="1600">
+                <a:sym typeface="+mn-ea"/>
+              </a:rPr>
+              <a:t>/</a:t>
+            </a:r>
+            <a:r>
+              <a:rPr lang="zh-CN" altLang="en-US" sz="1600">
+                <a:sym typeface="+mn-ea"/>
+              </a:rPr>
+              <a:t>播放的单曲</a:t>
+            </a:r>
+            <a:r>
+              <a:rPr lang="en-US" altLang="zh-CN" sz="1600">
+                <a:sym typeface="+mn-ea"/>
+              </a:rPr>
+              <a:t>/</a:t>
+            </a:r>
+            <a:r>
+              <a:rPr lang="zh-CN" altLang="en-US" sz="1600">
+                <a:sym typeface="+mn-ea"/>
+              </a:rPr>
+              <a:t>播放模式均存在本地</a:t>
+            </a:r>
+            <a:r>
+              <a:rPr lang="en-US" altLang="zh-CN" sz="1600">
+                <a:sym typeface="+mn-ea"/>
+              </a:rPr>
+              <a:t>, </a:t>
+            </a:r>
+            <a:r>
+              <a:rPr lang="zh-CN" altLang="en-US" sz="1600">
+                <a:sym typeface="+mn-ea"/>
+              </a:rPr>
+              <a:t>刷新也可保留其数据</a:t>
+            </a:r>
+            <a:endParaRPr lang="zh-CN" altLang="en-US" sz="1600"/>
+          </a:p>
+          <a:p>
+            <a:r>
+              <a:rPr lang="en-US" altLang="zh-CN" sz="1600"/>
+              <a:t>3. </a:t>
+            </a:r>
+            <a:r>
+              <a:rPr lang="zh-CN" altLang="en-US" sz="1600"/>
+              <a:t>随机播放采用的是洗牌算法</a:t>
+            </a:r>
+            <a:r>
+              <a:rPr lang="en-US" altLang="zh-CN" sz="1600"/>
+              <a:t>, </a:t>
+            </a:r>
+            <a:r>
+              <a:rPr lang="zh-CN" altLang="en-US" sz="1600"/>
+              <a:t>所以用户可以回复到上一首歌</a:t>
+            </a:r>
+            <a:r>
+              <a:rPr lang="en-US" altLang="zh-CN" sz="1600"/>
+              <a:t>, </a:t>
+            </a:r>
+            <a:r>
+              <a:rPr lang="zh-CN" altLang="en-US" sz="1600"/>
+              <a:t>也不会随机到重复的</a:t>
+            </a:r>
+            <a:r>
+              <a:rPr lang="zh-CN" altLang="en-US" sz="1600"/>
+              <a:t>歌</a:t>
+            </a:r>
+            <a:endParaRPr lang="zh-CN" altLang="en-US" sz="1600"/>
+          </a:p>
+        </p:txBody>
+      </p:sp>
+    </p:spTree>
+  </p:cSld>
+  <p:clrMapOvr>
+    <a:masterClrMapping/>
+  </p:clrMapOvr>
+</p:sld>
+</file>
+
+<file path=ppt/slides/slide17.xml><?xml version="1.0" encoding="utf-8"?>
+<p:sld xmlns:a="http://schemas.openxmlformats.org/drawingml/2006/main" xmlns:r="http://schemas.openxmlformats.org/officeDocument/2006/relationships" xmlns:p="http://schemas.openxmlformats.org/presentationml/2006/main">
+  <p:cSld>
+    <p:spTree>
+      <p:nvGrpSpPr>
+        <p:cNvPr id="1" name=""/>
+        <p:cNvGrpSpPr/>
+        <p:nvPr/>
+      </p:nvGrpSpPr>
+      <p:grpSpPr/>
+      <p:sp>
+        <p:nvSpPr>
+          <p:cNvPr id="2" name="标题 1"/>
+          <p:cNvSpPr>
+            <a:spLocks noGrp="1"/>
+          </p:cNvSpPr>
+          <p:nvPr>
+            <p:ph type="title"/>
+          </p:nvPr>
+        </p:nvSpPr>
+        <p:spPr>
+          <a:xfrm>
+            <a:off x="321310" y="283845"/>
+            <a:ext cx="10515600" cy="779145"/>
+          </a:xfrm>
+        </p:spPr>
+        <p:txBody>
+          <a:bodyPr/>
+          <a:p>
+            <a:r>
+              <a:rPr lang="zh-CN" altLang="en-US" sz="3600"/>
+              <a:t>首页</a:t>
+            </a:r>
+            <a:r>
+              <a:rPr lang="en-US" altLang="zh-CN" sz="1600"/>
+              <a:t>@</a:t>
+            </a:r>
+            <a:r>
+              <a:rPr lang="zh-CN" altLang="en-US" sz="1600"/>
+              <a:t>熊逸朗</a:t>
+            </a:r>
+            <a:endParaRPr lang="zh-CN" altLang="en-US" sz="1600"/>
+          </a:p>
+        </p:txBody>
+      </p:sp>
+      <p:pic>
+        <p:nvPicPr>
+          <p:cNvPr id="3" name="图片 2"/>
+          <p:cNvPicPr>
+            <a:picLocks noChangeAspect="1"/>
+          </p:cNvPicPr>
+          <p:nvPr/>
+        </p:nvPicPr>
+        <p:blipFill>
+          <a:blip r:embed="rId1"/>
+          <a:stretch>
+            <a:fillRect/>
+          </a:stretch>
+        </p:blipFill>
+        <p:spPr>
+          <a:xfrm>
+            <a:off x="3354070" y="675640"/>
+            <a:ext cx="5746115" cy="5506720"/>
+          </a:xfrm>
+          <a:prstGeom prst="rect">
+            <a:avLst/>
+          </a:prstGeom>
+        </p:spPr>
+      </p:pic>
+    </p:spTree>
+  </p:cSld>
+  <p:clrMapOvr>
+    <a:masterClrMapping/>
+  </p:clrMapOvr>
+</p:sld>
+</file>
+
+<file path=ppt/slides/slide18.xml><?xml version="1.0" encoding="utf-8"?>
+<p:sld xmlns:a="http://schemas.openxmlformats.org/drawingml/2006/main" xmlns:r="http://schemas.openxmlformats.org/officeDocument/2006/relationships" xmlns:p="http://schemas.openxmlformats.org/presentationml/2006/main">
+  <p:cSld>
+    <p:spTree>
+      <p:nvGrpSpPr>
+        <p:cNvPr id="1" name=""/>
+        <p:cNvGrpSpPr/>
+        <p:nvPr/>
+      </p:nvGrpSpPr>
+      <p:grpSpPr/>
+      <p:sp>
+        <p:nvSpPr>
+          <p:cNvPr id="2" name="标题 1"/>
+          <p:cNvSpPr>
+            <a:spLocks noGrp="1"/>
+          </p:cNvSpPr>
+          <p:nvPr>
+            <p:ph type="title"/>
+          </p:nvPr>
+        </p:nvSpPr>
+        <p:spPr>
+          <a:xfrm>
+            <a:off x="321310" y="283845"/>
+            <a:ext cx="10515600" cy="779145"/>
+          </a:xfrm>
+        </p:spPr>
+        <p:txBody>
+          <a:bodyPr/>
+          <a:p>
+            <a:r>
+              <a:rPr lang="zh-CN" altLang="en-US" sz="3600"/>
+              <a:t>封装网络请求</a:t>
+            </a:r>
+            <a:r>
+              <a:rPr lang="en-US" altLang="zh-CN" sz="1600"/>
+              <a:t>@</a:t>
+            </a:r>
+            <a:r>
+              <a:rPr lang="zh-CN" altLang="en-US" sz="1600"/>
+              <a:t>熊逸朗</a:t>
+            </a:r>
+            <a:endParaRPr lang="zh-CN" altLang="en-US" sz="1600"/>
+          </a:p>
+        </p:txBody>
+      </p:sp>
+      <p:pic>
+        <p:nvPicPr>
+          <p:cNvPr id="4" name="图片 3"/>
+          <p:cNvPicPr>
+            <a:picLocks noChangeAspect="1"/>
+          </p:cNvPicPr>
+          <p:nvPr/>
+        </p:nvPicPr>
+        <p:blipFill>
+          <a:blip r:embed="rId1"/>
+          <a:stretch>
+            <a:fillRect/>
+          </a:stretch>
+        </p:blipFill>
+        <p:spPr>
+          <a:xfrm>
+            <a:off x="7291705" y="403225"/>
+            <a:ext cx="3977005" cy="6051550"/>
+          </a:xfrm>
+          <a:prstGeom prst="rect">
+            <a:avLst/>
+          </a:prstGeom>
+        </p:spPr>
+      </p:pic>
+      <p:sp>
+        <p:nvSpPr>
+          <p:cNvPr id="5" name="文本框 4"/>
+          <p:cNvSpPr txBox="1"/>
+          <p:nvPr/>
+        </p:nvSpPr>
+        <p:spPr>
+          <a:xfrm>
+            <a:off x="1926590" y="2829560"/>
+            <a:ext cx="3783330" cy="1198880"/>
+          </a:xfrm>
+          <a:prstGeom prst="rect">
+            <a:avLst/>
+          </a:prstGeom>
+          <a:noFill/>
+        </p:spPr>
+        <p:txBody>
+          <a:bodyPr wrap="square" rtlCol="0">
+            <a:spAutoFit/>
+          </a:bodyPr>
+          <a:p>
+            <a:r>
+              <a:rPr lang="zh-CN" altLang="en-US" sz="2400"/>
+              <a:t>对</a:t>
+            </a:r>
+            <a:r>
+              <a:rPr lang="en-US" altLang="zh-CN" sz="2400"/>
+              <a:t> axios </a:t>
+            </a:r>
+            <a:r>
+              <a:rPr lang="zh-CN" altLang="en-US" sz="2400"/>
+              <a:t>进行封装</a:t>
+            </a:r>
+            <a:endParaRPr lang="zh-CN" altLang="en-US" sz="2400"/>
+          </a:p>
+          <a:p>
+            <a:r>
+              <a:rPr lang="en-US" altLang="zh-CN" sz="2400"/>
+              <a:t>1. </a:t>
+            </a:r>
+            <a:r>
+              <a:rPr lang="zh-CN" altLang="en-US" sz="2400"/>
+              <a:t>处理了异常情况</a:t>
+            </a:r>
+            <a:endParaRPr lang="zh-CN" altLang="en-US" sz="2400"/>
+          </a:p>
+          <a:p>
+            <a:r>
+              <a:rPr lang="en-US" altLang="zh-CN" sz="2400"/>
+              <a:t>2. </a:t>
+            </a:r>
+            <a:r>
+              <a:rPr lang="zh-CN" altLang="en-US" sz="2400"/>
+              <a:t>对重复请求进行了节流</a:t>
+            </a:r>
+            <a:endParaRPr lang="zh-CN" altLang="en-US" sz="2400"/>
+          </a:p>
+        </p:txBody>
+      </p:sp>
+    </p:spTree>
+  </p:cSld>
+  <p:clrMapOvr>
+    <a:masterClrMapping/>
+  </p:clrMapOvr>
+</p:sld>
+</file>
+
+<file path=ppt/slides/slide19.xml><?xml version="1.0" encoding="utf-8"?>
+<p:sld xmlns:a="http://schemas.openxmlformats.org/drawingml/2006/main" xmlns:r="http://schemas.openxmlformats.org/officeDocument/2006/relationships" xmlns:p="http://schemas.openxmlformats.org/presentationml/2006/main">
+  <p:cSld>
+    <p:spTree>
+      <p:nvGrpSpPr>
+        <p:cNvPr id="1" name=""/>
+        <p:cNvGrpSpPr/>
+        <p:nvPr/>
+      </p:nvGrpSpPr>
+      <p:grpSpPr/>
+      <p:sp>
+        <p:nvSpPr>
+          <p:cNvPr id="2" name="标题 1"/>
+          <p:cNvSpPr>
+            <a:spLocks noGrp="1"/>
+          </p:cNvSpPr>
+          <p:nvPr>
+            <p:ph type="title"/>
+          </p:nvPr>
+        </p:nvSpPr>
+        <p:spPr>
+          <a:xfrm>
+            <a:off x="321310" y="283845"/>
+            <a:ext cx="10515600" cy="779145"/>
+          </a:xfrm>
+        </p:spPr>
+        <p:txBody>
+          <a:bodyPr/>
+          <a:p>
+            <a:r>
+              <a:rPr lang="zh-CN" altLang="en-US" sz="3600"/>
+              <a:t>封装任务调度器</a:t>
+            </a:r>
+            <a:r>
+              <a:rPr lang="en-US" altLang="zh-CN" sz="1600"/>
+              <a:t>@</a:t>
+            </a:r>
+            <a:r>
+              <a:rPr lang="zh-CN" altLang="en-US" sz="1600"/>
+              <a:t>熊逸朗</a:t>
+            </a:r>
+            <a:endParaRPr lang="zh-CN" altLang="en-US" sz="1600"/>
+          </a:p>
+        </p:txBody>
+      </p:sp>
+      <p:sp>
+        <p:nvSpPr>
+          <p:cNvPr id="5" name="文本框 4"/>
+          <p:cNvSpPr txBox="1"/>
+          <p:nvPr/>
+        </p:nvSpPr>
+        <p:spPr>
+          <a:xfrm>
+            <a:off x="1267460" y="2094865"/>
+            <a:ext cx="3783330" cy="2799715"/>
+          </a:xfrm>
+          <a:prstGeom prst="rect">
+            <a:avLst/>
+          </a:prstGeom>
+          <a:noFill/>
+        </p:spPr>
+        <p:txBody>
+          <a:bodyPr wrap="square" rtlCol="0">
+            <a:spAutoFit/>
+          </a:bodyPr>
+          <a:p>
+            <a:r>
+              <a:rPr lang="zh-CN" altLang="en-US" sz="2400"/>
+              <a:t>实现了工具类</a:t>
+            </a:r>
+            <a:r>
+              <a:rPr lang="en-US" altLang="zh-CN" sz="2400"/>
+              <a:t> Scheduler, </a:t>
+            </a:r>
+            <a:r>
+              <a:rPr lang="zh-CN" altLang="en-US" sz="2400"/>
+              <a:t>对异步任务进行调度控制</a:t>
+            </a:r>
+            <a:r>
+              <a:rPr lang="en-US" altLang="zh-CN" sz="2400"/>
+              <a:t>, </a:t>
+            </a:r>
+            <a:r>
+              <a:rPr lang="zh-CN" altLang="en-US" sz="2400"/>
+              <a:t>使并发量小于</a:t>
+            </a:r>
+            <a:r>
+              <a:rPr lang="zh-CN" altLang="en-US" sz="2400"/>
+              <a:t>指定值</a:t>
+            </a:r>
+            <a:endParaRPr lang="zh-CN" altLang="en-US" sz="2400"/>
+          </a:p>
+          <a:p>
+            <a:endParaRPr lang="zh-CN" altLang="en-US" sz="2400"/>
+          </a:p>
+          <a:p>
+            <a:r>
+              <a:rPr lang="zh-CN" altLang="en-US" sz="2000" b="1">
+                <a:solidFill>
+                  <a:schemeClr val="bg1">
+                    <a:lumMod val="50000"/>
+                  </a:schemeClr>
+                </a:solidFill>
+              </a:rPr>
+              <a:t>使用场景</a:t>
+            </a:r>
+            <a:r>
+              <a:rPr lang="en-US" altLang="zh-CN" sz="2000" b="1">
+                <a:solidFill>
+                  <a:schemeClr val="bg1">
+                    <a:lumMod val="50000"/>
+                  </a:schemeClr>
+                </a:solidFill>
+              </a:rPr>
+              <a:t>:</a:t>
+            </a:r>
+            <a:r>
+              <a:rPr lang="en-US" altLang="zh-CN" sz="2000">
+                <a:solidFill>
+                  <a:schemeClr val="bg1">
+                    <a:lumMod val="50000"/>
+                  </a:schemeClr>
+                </a:solidFill>
+              </a:rPr>
+              <a:t> </a:t>
+            </a:r>
+            <a:r>
+              <a:rPr lang="zh-CN" altLang="en-US" sz="2000">
+                <a:solidFill>
+                  <a:schemeClr val="bg1">
+                    <a:lumMod val="50000"/>
+                  </a:schemeClr>
+                </a:solidFill>
+              </a:rPr>
+              <a:t>在切歌的时候疯狂点击</a:t>
+            </a:r>
+            <a:r>
+              <a:rPr lang="en-US" altLang="zh-CN" sz="2000">
+                <a:solidFill>
+                  <a:schemeClr val="bg1">
+                    <a:lumMod val="50000"/>
+                  </a:schemeClr>
+                </a:solidFill>
+              </a:rPr>
+              <a:t>, </a:t>
+            </a:r>
+            <a:r>
+              <a:rPr lang="zh-CN" altLang="en-US" sz="2000">
+                <a:solidFill>
+                  <a:schemeClr val="bg1">
+                    <a:lumMod val="50000"/>
+                  </a:schemeClr>
+                </a:solidFill>
+              </a:rPr>
+              <a:t>会依次执行异步任务</a:t>
+            </a:r>
+            <a:r>
+              <a:rPr lang="en-US" altLang="zh-CN" sz="2000">
+                <a:solidFill>
+                  <a:schemeClr val="bg1">
+                    <a:lumMod val="50000"/>
+                  </a:schemeClr>
+                </a:solidFill>
+              </a:rPr>
+              <a:t>, </a:t>
+            </a:r>
+            <a:r>
+              <a:rPr lang="zh-CN" altLang="en-US" sz="2000">
+                <a:solidFill>
+                  <a:schemeClr val="bg1">
+                    <a:lumMod val="50000"/>
+                  </a:schemeClr>
+                </a:solidFill>
+              </a:rPr>
+              <a:t>而不会同时并发执行一批任务</a:t>
+            </a:r>
+            <a:r>
+              <a:rPr lang="en-US" altLang="zh-CN" sz="2000">
+                <a:solidFill>
+                  <a:schemeClr val="bg1">
+                    <a:lumMod val="50000"/>
+                  </a:schemeClr>
+                </a:solidFill>
+              </a:rPr>
+              <a:t>, </a:t>
+            </a:r>
+            <a:r>
+              <a:rPr lang="zh-CN" altLang="en-US" sz="2000">
+                <a:solidFill>
+                  <a:schemeClr val="bg1">
+                    <a:lumMod val="50000"/>
+                  </a:schemeClr>
+                </a:solidFill>
+              </a:rPr>
+              <a:t>造成顺序混乱</a:t>
+            </a:r>
+            <a:endParaRPr lang="zh-CN" altLang="en-US" sz="2000">
+              <a:solidFill>
+                <a:schemeClr val="bg1">
+                  <a:lumMod val="50000"/>
+                </a:schemeClr>
+              </a:solidFill>
+            </a:endParaRPr>
+          </a:p>
+        </p:txBody>
+      </p:sp>
+      <p:pic>
+        <p:nvPicPr>
+          <p:cNvPr id="3" name="图片 2"/>
+          <p:cNvPicPr>
+            <a:picLocks noChangeAspect="1"/>
+          </p:cNvPicPr>
+          <p:nvPr/>
+        </p:nvPicPr>
+        <p:blipFill>
+          <a:blip r:embed="rId1"/>
+          <a:stretch>
+            <a:fillRect/>
+          </a:stretch>
+        </p:blipFill>
+        <p:spPr>
+          <a:xfrm>
+            <a:off x="6234430" y="119380"/>
+            <a:ext cx="5726430" cy="6618605"/>
+          </a:xfrm>
+          <a:prstGeom prst="rect">
+            <a:avLst/>
+          </a:prstGeom>
+        </p:spPr>
+      </p:pic>
     </p:spTree>
   </p:cSld>
   <p:clrMapOvr>
@@ -3051,7 +4621,230 @@
               <a:rPr lang="en-US" altLang="zh-CN">
                 <a:hlinkClick r:id="rId1" tooltip=""/>
               </a:rPr>
-              <a:t>http://www.xiong35.cn/netease/</a:t>
+              <a:t>http://netease.xiong35.cn</a:t>
+            </a:r>
+            <a:endParaRPr lang="en-US" altLang="zh-CN"/>
+          </a:p>
+        </p:txBody>
+      </p:sp>
+    </p:spTree>
+  </p:cSld>
+  <p:clrMapOvr>
+    <a:masterClrMapping/>
+  </p:clrMapOvr>
+</p:sld>
+</file>
+
+<file path=ppt/slides/slide20.xml><?xml version="1.0" encoding="utf-8"?>
+<p:sld xmlns:a="http://schemas.openxmlformats.org/drawingml/2006/main" xmlns:r="http://schemas.openxmlformats.org/officeDocument/2006/relationships" xmlns:p="http://schemas.openxmlformats.org/presentationml/2006/main">
+  <p:cSld>
+    <p:spTree>
+      <p:nvGrpSpPr>
+        <p:cNvPr id="1" name=""/>
+        <p:cNvGrpSpPr/>
+        <p:nvPr/>
+      </p:nvGrpSpPr>
+      <p:grpSpPr/>
+      <p:sp>
+        <p:nvSpPr>
+          <p:cNvPr id="2" name="标题 1"/>
+          <p:cNvSpPr>
+            <a:spLocks noGrp="1"/>
+          </p:cNvSpPr>
+          <p:nvPr>
+            <p:ph type="title"/>
+          </p:nvPr>
+        </p:nvSpPr>
+        <p:spPr>
+          <a:xfrm>
+            <a:off x="321310" y="283845"/>
+            <a:ext cx="10515600" cy="779145"/>
+          </a:xfrm>
+        </p:spPr>
+        <p:txBody>
+          <a:bodyPr/>
+          <a:p>
+            <a:r>
+              <a:rPr lang="zh-CN" altLang="en-US" sz="3600"/>
+              <a:t>编写脚本和</a:t>
+            </a:r>
+            <a:r>
+              <a:rPr lang="en-US" altLang="zh-CN" sz="3600"/>
+              <a:t> snippet</a:t>
+            </a:r>
+            <a:r>
+              <a:rPr lang="en-US" altLang="zh-CN" sz="1600"/>
+              <a:t>@</a:t>
+            </a:r>
+            <a:r>
+              <a:rPr lang="zh-CN" altLang="en-US" sz="1600"/>
+              <a:t>熊逸朗</a:t>
+            </a:r>
+            <a:endParaRPr lang="zh-CN" altLang="en-US" sz="1600"/>
+          </a:p>
+        </p:txBody>
+      </p:sp>
+      <p:pic>
+        <p:nvPicPr>
+          <p:cNvPr id="4" name="图片 3"/>
+          <p:cNvPicPr>
+            <a:picLocks noChangeAspect="1"/>
+          </p:cNvPicPr>
+          <p:nvPr/>
+        </p:nvPicPr>
+        <p:blipFill>
+          <a:blip r:embed="rId1"/>
+          <a:stretch>
+            <a:fillRect/>
+          </a:stretch>
+        </p:blipFill>
+        <p:spPr>
+          <a:xfrm>
+            <a:off x="940435" y="1116330"/>
+            <a:ext cx="4307840" cy="4625340"/>
+          </a:xfrm>
+          <a:prstGeom prst="rect">
+            <a:avLst/>
+          </a:prstGeom>
+        </p:spPr>
+      </p:pic>
+      <p:sp>
+        <p:nvSpPr>
+          <p:cNvPr id="6" name="文本框 5"/>
+          <p:cNvSpPr txBox="1"/>
+          <p:nvPr/>
+        </p:nvSpPr>
+        <p:spPr>
+          <a:xfrm>
+            <a:off x="1684655" y="5928360"/>
+            <a:ext cx="2820035" cy="829945"/>
+          </a:xfrm>
+          <a:prstGeom prst="rect">
+            <a:avLst/>
+          </a:prstGeom>
+          <a:noFill/>
+        </p:spPr>
+        <p:txBody>
+          <a:bodyPr wrap="square" rtlCol="0">
+            <a:spAutoFit/>
+          </a:bodyPr>
+          <a:p>
+            <a:r>
+              <a:rPr lang="zh-CN" altLang="en-US" sz="1600"/>
+              <a:t>提高开发效率的脚本。创建一个组件的文件夹及基本结构、样式</a:t>
+            </a:r>
+            <a:endParaRPr lang="zh-CN" altLang="en-US" sz="1600"/>
+          </a:p>
+        </p:txBody>
+      </p:sp>
+      <p:pic>
+        <p:nvPicPr>
+          <p:cNvPr id="7" name="图片 6"/>
+          <p:cNvPicPr>
+            <a:picLocks noChangeAspect="1"/>
+          </p:cNvPicPr>
+          <p:nvPr/>
+        </p:nvPicPr>
+        <p:blipFill>
+          <a:blip r:embed="rId2"/>
+          <a:stretch>
+            <a:fillRect/>
+          </a:stretch>
+        </p:blipFill>
+        <p:spPr>
+          <a:xfrm>
+            <a:off x="7393940" y="433070"/>
+            <a:ext cx="3574415" cy="5308600"/>
+          </a:xfrm>
+          <a:prstGeom prst="rect">
+            <a:avLst/>
+          </a:prstGeom>
+        </p:spPr>
+      </p:pic>
+      <p:sp>
+        <p:nvSpPr>
+          <p:cNvPr id="8" name="文本框 7"/>
+          <p:cNvSpPr txBox="1"/>
+          <p:nvPr/>
+        </p:nvSpPr>
+        <p:spPr>
+          <a:xfrm>
+            <a:off x="7771130" y="5928360"/>
+            <a:ext cx="2820035" cy="583565"/>
+          </a:xfrm>
+          <a:prstGeom prst="rect">
+            <a:avLst/>
+          </a:prstGeom>
+          <a:noFill/>
+        </p:spPr>
+        <p:txBody>
+          <a:bodyPr wrap="square" rtlCol="0">
+            <a:spAutoFit/>
+          </a:bodyPr>
+          <a:p>
+            <a:r>
+              <a:rPr lang="en-US" altLang="zh-CN" sz="1600"/>
+              <a:t>VS</a:t>
+            </a:r>
+            <a:r>
+              <a:rPr lang="en-US" altLang="zh-CN" sz="1600"/>
+              <a:t>Code snippet</a:t>
+            </a:r>
+            <a:r>
+              <a:rPr lang="zh-CN" altLang="en-US" sz="1600"/>
+              <a:t>。可</a:t>
+            </a:r>
+            <a:r>
+              <a:rPr lang="zh-CN" altLang="en-US" sz="1600"/>
+              <a:t>一键生成一些反复使用</a:t>
+            </a:r>
+            <a:r>
+              <a:rPr lang="zh-CN" altLang="en-US" sz="1600"/>
+              <a:t>的模板</a:t>
+            </a:r>
+            <a:r>
+              <a:rPr lang="zh-CN" altLang="en-US" sz="1600"/>
+              <a:t>代码</a:t>
+            </a:r>
+            <a:endParaRPr lang="zh-CN" altLang="en-US" sz="1600"/>
+          </a:p>
+        </p:txBody>
+      </p:sp>
+    </p:spTree>
+  </p:cSld>
+  <p:clrMapOvr>
+    <a:masterClrMapping/>
+  </p:clrMapOvr>
+</p:sld>
+</file>
+
+<file path=ppt/slides/slide21.xml><?xml version="1.0" encoding="utf-8"?>
+<p:sld xmlns:a="http://schemas.openxmlformats.org/drawingml/2006/main" xmlns:r="http://schemas.openxmlformats.org/officeDocument/2006/relationships" xmlns:p="http://schemas.openxmlformats.org/presentationml/2006/main">
+  <p:cSld>
+    <p:spTree>
+      <p:nvGrpSpPr>
+        <p:cNvPr id="1" name=""/>
+        <p:cNvGrpSpPr/>
+        <p:nvPr/>
+      </p:nvGrpSpPr>
+      <p:grpSpPr/>
+      <p:sp>
+        <p:nvSpPr>
+          <p:cNvPr id="2" name="标题 1"/>
+          <p:cNvSpPr>
+            <a:spLocks noGrp="1"/>
+          </p:cNvSpPr>
+          <p:nvPr>
+            <p:ph type="ctrTitle"/>
+          </p:nvPr>
+        </p:nvSpPr>
+        <p:spPr/>
+        <p:txBody>
+          <a:bodyPr/>
+          <a:p>
+            <a:r>
+              <a:rPr lang="en-US" altLang="zh-CN"/>
+              <a:t>Thanks!</a:t>
             </a:r>
             <a:endParaRPr lang="en-US" altLang="zh-CN"/>
           </a:p>
@@ -3077,25 +4870,203 @@
       <p:grpSpPr/>
       <p:sp>
         <p:nvSpPr>
-          <p:cNvPr id="2" name="标题 1"/>
-          <p:cNvSpPr>
-            <a:spLocks noGrp="1"/>
-          </p:cNvSpPr>
-          <p:nvPr>
-            <p:ph type="ctrTitle"/>
-          </p:nvPr>
-        </p:nvSpPr>
-        <p:spPr/>
-        <p:txBody>
-          <a:bodyPr/>
+          <p:cNvPr id="5" name="文本框 4"/>
+          <p:cNvSpPr txBox="1"/>
+          <p:nvPr/>
+        </p:nvSpPr>
+        <p:spPr>
+          <a:xfrm>
+            <a:off x="393065" y="319405"/>
+            <a:ext cx="2282190" cy="460375"/>
+          </a:xfrm>
+          <a:prstGeom prst="rect">
+            <a:avLst/>
+          </a:prstGeom>
+          <a:noFill/>
+        </p:spPr>
+        <p:txBody>
+          <a:bodyPr wrap="square" rtlCol="0">
+            <a:spAutoFit/>
+          </a:bodyPr>
+          <a:p>
+            <a:r>
+              <a:rPr lang="zh-CN" altLang="en-US" sz="2400" b="1"/>
+              <a:t>概览</a:t>
+            </a:r>
+            <a:endParaRPr lang="zh-CN" altLang="en-US" sz="2400" b="1"/>
+          </a:p>
+        </p:txBody>
+      </p:sp>
+      <p:sp>
+        <p:nvSpPr>
+          <p:cNvPr id="8" name="文本框 7"/>
+          <p:cNvSpPr txBox="1"/>
+          <p:nvPr/>
+        </p:nvSpPr>
+        <p:spPr>
+          <a:xfrm>
+            <a:off x="587375" y="1151255"/>
+            <a:ext cx="2180590" cy="2553335"/>
+          </a:xfrm>
+          <a:prstGeom prst="rect">
+            <a:avLst/>
+          </a:prstGeom>
+          <a:noFill/>
+        </p:spPr>
+        <p:txBody>
+          <a:bodyPr wrap="square" rtlCol="0">
+            <a:spAutoFit/>
+          </a:bodyPr>
+          <a:p>
+            <a:r>
+              <a:rPr lang="zh-CN" altLang="en-US" sz="2000"/>
+              <a:t>实现的界面包括</a:t>
+            </a:r>
+            <a:r>
+              <a:rPr lang="en-US" altLang="zh-CN" sz="2000"/>
+              <a:t>:</a:t>
+            </a:r>
+            <a:endParaRPr lang="en-US" altLang="zh-CN" sz="2000"/>
+          </a:p>
+          <a:p>
+            <a:endParaRPr lang="en-US" altLang="zh-CN" sz="2000"/>
+          </a:p>
+          <a:p>
+            <a:pPr marL="285750" indent="-285750">
+              <a:buFont typeface="Arial" panose="020B0604020202020204" pitchFamily="34" charset="0"/>
+              <a:buChar char="•"/>
+            </a:pPr>
+            <a:r>
+              <a:rPr lang="zh-CN" altLang="en-US" sz="2000">
+                <a:hlinkClick r:id="rId1" tooltip=""/>
+              </a:rPr>
+              <a:t>主页</a:t>
+            </a:r>
+            <a:endParaRPr lang="zh-CN" altLang="en-US" sz="2000"/>
+          </a:p>
+          <a:p>
+            <a:pPr marL="285750" indent="-285750">
+              <a:buFont typeface="Arial" panose="020B0604020202020204" pitchFamily="34" charset="0"/>
+              <a:buChar char="•"/>
+            </a:pPr>
+            <a:r>
+              <a:rPr lang="zh-CN" altLang="en-US" sz="2000">
+                <a:hlinkClick r:id="rId2" tooltip=""/>
+              </a:rPr>
+              <a:t>歌曲详情页</a:t>
+            </a:r>
+            <a:endParaRPr lang="zh-CN" altLang="en-US" sz="2000"/>
+          </a:p>
+          <a:p>
+            <a:pPr marL="285750" indent="-285750">
+              <a:buFont typeface="Arial" panose="020B0604020202020204" pitchFamily="34" charset="0"/>
+              <a:buChar char="•"/>
+            </a:pPr>
+            <a:r>
+              <a:rPr lang="zh-CN" altLang="en-US" sz="2000">
+                <a:hlinkClick r:id="rId3" tooltip=""/>
+              </a:rPr>
+              <a:t>用户详情页</a:t>
+            </a:r>
+            <a:endParaRPr lang="zh-CN" altLang="en-US" sz="2000"/>
+          </a:p>
+          <a:p>
+            <a:pPr marL="285750" indent="-285750">
+              <a:buFont typeface="Arial" panose="020B0604020202020204" pitchFamily="34" charset="0"/>
+              <a:buChar char="•"/>
+            </a:pPr>
+            <a:r>
+              <a:rPr lang="zh-CN" altLang="en-US" sz="2000">
+                <a:hlinkClick r:id="rId4" tooltip=""/>
+              </a:rPr>
+              <a:t>歌单详情页</a:t>
+            </a:r>
+            <a:endParaRPr lang="zh-CN" altLang="en-US" sz="2000"/>
+          </a:p>
+          <a:p>
+            <a:pPr marL="285750" indent="-285750">
+              <a:buFont typeface="Arial" panose="020B0604020202020204" pitchFamily="34" charset="0"/>
+              <a:buChar char="•"/>
+            </a:pPr>
+            <a:r>
+              <a:rPr lang="zh-CN" altLang="en-US" sz="2000"/>
+              <a:t>搜索页</a:t>
+            </a:r>
+            <a:endParaRPr lang="zh-CN" altLang="en-US" sz="2000">
+              <a:hlinkClick r:id="rId4" tooltip=""/>
+            </a:endParaRPr>
+          </a:p>
+          <a:p>
+            <a:pPr marL="285750" indent="-285750">
+              <a:buFont typeface="Arial" panose="020B0604020202020204" pitchFamily="34" charset="0"/>
+              <a:buChar char="•"/>
+            </a:pPr>
+            <a:endParaRPr lang="zh-CN" altLang="en-US" sz="2000">
+              <a:hlinkClick r:id="rId4" tooltip=""/>
+            </a:endParaRPr>
+          </a:p>
+        </p:txBody>
+      </p:sp>
+      <p:sp>
+        <p:nvSpPr>
+          <p:cNvPr id="9" name="文本框 8"/>
+          <p:cNvSpPr txBox="1"/>
+          <p:nvPr/>
+        </p:nvSpPr>
+        <p:spPr>
+          <a:xfrm>
+            <a:off x="587375" y="3829685"/>
+            <a:ext cx="10203180" cy="368300"/>
+          </a:xfrm>
+          <a:prstGeom prst="rect">
+            <a:avLst/>
+          </a:prstGeom>
+          <a:noFill/>
+        </p:spPr>
+        <p:txBody>
+          <a:bodyPr wrap="square" rtlCol="0">
+            <a:spAutoFit/>
+          </a:bodyPr>
           <a:p>
             <a:r>
               <a:rPr lang="zh-CN" altLang="en-US"/>
-              <a:t>项目</a:t>
+              <a:t>由于实现功能和细节较多</a:t>
+            </a:r>
+            <a:r>
+              <a:rPr lang="en-US" altLang="zh-CN"/>
+              <a:t>, </a:t>
             </a:r>
             <a:r>
               <a:rPr lang="zh-CN" altLang="en-US"/>
-              <a:t>结构</a:t>
+              <a:t>以下仅简单展示页面</a:t>
+            </a:r>
+            <a:r>
+              <a:rPr lang="en-US" altLang="zh-CN"/>
+              <a:t>, </a:t>
+            </a:r>
+            <a:r>
+              <a:rPr lang="zh-CN" altLang="en-US"/>
+              <a:t>细节在</a:t>
+            </a:r>
+            <a:r>
+              <a:rPr lang="en-US" altLang="zh-CN"/>
+              <a:t>”</a:t>
+            </a:r>
+            <a:r>
+              <a:rPr lang="zh-CN" altLang="en-US"/>
+              <a:t>技术细节</a:t>
+            </a:r>
+            <a:r>
+              <a:rPr lang="en-US" altLang="zh-CN"/>
+              <a:t>”</a:t>
+            </a:r>
+            <a:r>
+              <a:rPr lang="zh-CN" altLang="en-US"/>
+              <a:t>部分</a:t>
+            </a:r>
+            <a:r>
+              <a:rPr lang="zh-CN" altLang="en-US"/>
+              <a:t>介绍</a:t>
             </a:r>
             <a:endParaRPr lang="zh-CN" altLang="en-US"/>
           </a:p>
@@ -3121,21 +5092,89 @@
       <p:grpSpPr/>
       <p:sp>
         <p:nvSpPr>
-          <p:cNvPr id="2" name="标题 1"/>
-          <p:cNvSpPr>
-            <a:spLocks noGrp="1"/>
-          </p:cNvSpPr>
-          <p:nvPr>
-            <p:ph type="ctrTitle"/>
-          </p:nvPr>
-        </p:nvSpPr>
-        <p:spPr/>
-        <p:txBody>
-          <a:bodyPr/>
+          <p:cNvPr id="5" name="文本框 4"/>
+          <p:cNvSpPr txBox="1"/>
+          <p:nvPr/>
+        </p:nvSpPr>
+        <p:spPr>
+          <a:xfrm>
+            <a:off x="393065" y="319405"/>
+            <a:ext cx="2282190" cy="460375"/>
+          </a:xfrm>
+          <a:prstGeom prst="rect">
+            <a:avLst/>
+          </a:prstGeom>
+          <a:noFill/>
+        </p:spPr>
+        <p:txBody>
+          <a:bodyPr wrap="square" rtlCol="0">
+            <a:spAutoFit/>
+          </a:bodyPr>
+          <a:p>
+            <a:r>
+              <a:rPr lang="zh-CN" altLang="en-US" sz="2400" b="1"/>
+              <a:t>主页</a:t>
+            </a:r>
+            <a:endParaRPr lang="zh-CN" altLang="en-US" sz="2400" b="1"/>
+          </a:p>
+        </p:txBody>
+      </p:sp>
+      <p:pic>
+        <p:nvPicPr>
+          <p:cNvPr id="2" name="图片 1"/>
+          <p:cNvPicPr>
+            <a:picLocks noChangeAspect="1"/>
+          </p:cNvPicPr>
+          <p:nvPr/>
+        </p:nvPicPr>
+        <p:blipFill>
+          <a:blip r:embed="rId1"/>
+          <a:stretch>
+            <a:fillRect/>
+          </a:stretch>
+        </p:blipFill>
+        <p:spPr>
+          <a:xfrm>
+            <a:off x="1732280" y="948055"/>
+            <a:ext cx="8728075" cy="4100195"/>
+          </a:xfrm>
+          <a:prstGeom prst="rect">
+            <a:avLst/>
+          </a:prstGeom>
+        </p:spPr>
+      </p:pic>
+      <p:sp>
+        <p:nvSpPr>
+          <p:cNvPr id="3" name="文本框 2"/>
+          <p:cNvSpPr txBox="1"/>
+          <p:nvPr/>
+        </p:nvSpPr>
+        <p:spPr>
+          <a:xfrm>
+            <a:off x="678815" y="5391150"/>
+            <a:ext cx="5163185" cy="368300"/>
+          </a:xfrm>
+          <a:prstGeom prst="rect">
+            <a:avLst/>
+          </a:prstGeom>
+          <a:noFill/>
+        </p:spPr>
+        <p:txBody>
+          <a:bodyPr wrap="square" rtlCol="0">
+            <a:spAutoFit/>
+          </a:bodyPr>
           <a:p>
             <a:r>
               <a:rPr lang="zh-CN" altLang="en-US"/>
-              <a:t>实现细节</a:t>
+              <a:t>负责人</a:t>
+            </a:r>
+            <a:r>
+              <a:rPr lang="en-US" altLang="zh-CN"/>
+              <a:t>: </a:t>
+            </a:r>
+            <a:r>
+              <a:rPr lang="zh-CN" altLang="en-US"/>
+              <a:t>熊逸朗</a:t>
             </a:r>
             <a:endParaRPr lang="zh-CN" altLang="en-US"/>
           </a:p>
@@ -3161,6 +5200,418 @@
       <p:grpSpPr/>
       <p:sp>
         <p:nvSpPr>
+          <p:cNvPr id="5" name="文本框 4"/>
+          <p:cNvSpPr txBox="1"/>
+          <p:nvPr/>
+        </p:nvSpPr>
+        <p:spPr>
+          <a:xfrm>
+            <a:off x="393065" y="319405"/>
+            <a:ext cx="2282190" cy="460375"/>
+          </a:xfrm>
+          <a:prstGeom prst="rect">
+            <a:avLst/>
+          </a:prstGeom>
+          <a:noFill/>
+        </p:spPr>
+        <p:txBody>
+          <a:bodyPr wrap="square" rtlCol="0">
+            <a:spAutoFit/>
+          </a:bodyPr>
+          <a:p>
+            <a:r>
+              <a:rPr lang="zh-CN" altLang="en-US" sz="2400" b="1"/>
+              <a:t>歌曲</a:t>
+            </a:r>
+            <a:r>
+              <a:rPr lang="zh-CN" altLang="en-US" sz="2400" b="1"/>
+              <a:t>详情页</a:t>
+            </a:r>
+            <a:endParaRPr lang="zh-CN" altLang="en-US" sz="2400" b="1"/>
+          </a:p>
+        </p:txBody>
+      </p:sp>
+      <p:sp>
+        <p:nvSpPr>
+          <p:cNvPr id="3" name="文本框 2"/>
+          <p:cNvSpPr txBox="1"/>
+          <p:nvPr/>
+        </p:nvSpPr>
+        <p:spPr>
+          <a:xfrm>
+            <a:off x="678815" y="5391150"/>
+            <a:ext cx="5163185" cy="368300"/>
+          </a:xfrm>
+          <a:prstGeom prst="rect">
+            <a:avLst/>
+          </a:prstGeom>
+          <a:noFill/>
+        </p:spPr>
+        <p:txBody>
+          <a:bodyPr wrap="square" rtlCol="0">
+            <a:spAutoFit/>
+          </a:bodyPr>
+          <a:p>
+            <a:r>
+              <a:rPr lang="zh-CN" altLang="en-US"/>
+              <a:t>负责人</a:t>
+            </a:r>
+            <a:r>
+              <a:rPr lang="en-US" altLang="zh-CN"/>
+              <a:t>: </a:t>
+            </a:r>
+            <a:r>
+              <a:rPr lang="zh-CN" altLang="en-US"/>
+              <a:t>熊逸朗</a:t>
+            </a:r>
+            <a:endParaRPr lang="zh-CN" altLang="en-US"/>
+          </a:p>
+        </p:txBody>
+      </p:sp>
+      <p:pic>
+        <p:nvPicPr>
+          <p:cNvPr id="4" name="图片 3"/>
+          <p:cNvPicPr>
+            <a:picLocks noChangeAspect="1"/>
+          </p:cNvPicPr>
+          <p:nvPr/>
+        </p:nvPicPr>
+        <p:blipFill>
+          <a:blip r:embed="rId1"/>
+          <a:stretch>
+            <a:fillRect/>
+          </a:stretch>
+        </p:blipFill>
+        <p:spPr>
+          <a:xfrm>
+            <a:off x="1688465" y="956945"/>
+            <a:ext cx="9070975" cy="4257040"/>
+          </a:xfrm>
+          <a:prstGeom prst="rect">
+            <a:avLst/>
+          </a:prstGeom>
+        </p:spPr>
+      </p:pic>
+    </p:spTree>
+  </p:cSld>
+  <p:clrMapOvr>
+    <a:masterClrMapping/>
+  </p:clrMapOvr>
+</p:sld>
+</file>
+
+<file path=ppt/slides/slide6.xml><?xml version="1.0" encoding="utf-8"?>
+<p:sld xmlns:a="http://schemas.openxmlformats.org/drawingml/2006/main" xmlns:r="http://schemas.openxmlformats.org/officeDocument/2006/relationships" xmlns:p="http://schemas.openxmlformats.org/presentationml/2006/main">
+  <p:cSld>
+    <p:spTree>
+      <p:nvGrpSpPr>
+        <p:cNvPr id="1" name=""/>
+        <p:cNvGrpSpPr/>
+        <p:nvPr/>
+      </p:nvGrpSpPr>
+      <p:grpSpPr/>
+      <p:sp>
+        <p:nvSpPr>
+          <p:cNvPr id="5" name="文本框 4"/>
+          <p:cNvSpPr txBox="1"/>
+          <p:nvPr/>
+        </p:nvSpPr>
+        <p:spPr>
+          <a:xfrm>
+            <a:off x="393065" y="319405"/>
+            <a:ext cx="2282190" cy="460375"/>
+          </a:xfrm>
+          <a:prstGeom prst="rect">
+            <a:avLst/>
+          </a:prstGeom>
+          <a:noFill/>
+        </p:spPr>
+        <p:txBody>
+          <a:bodyPr wrap="square" rtlCol="0">
+            <a:spAutoFit/>
+          </a:bodyPr>
+          <a:p>
+            <a:r>
+              <a:rPr lang="zh-CN" altLang="en-US" sz="2400" b="1"/>
+              <a:t>用户详情页</a:t>
+            </a:r>
+            <a:endParaRPr lang="zh-CN" altLang="en-US" sz="2400" b="1"/>
+          </a:p>
+        </p:txBody>
+      </p:sp>
+      <p:sp>
+        <p:nvSpPr>
+          <p:cNvPr id="3" name="文本框 2"/>
+          <p:cNvSpPr txBox="1"/>
+          <p:nvPr/>
+        </p:nvSpPr>
+        <p:spPr>
+          <a:xfrm>
+            <a:off x="678815" y="5391150"/>
+            <a:ext cx="5163185" cy="368300"/>
+          </a:xfrm>
+          <a:prstGeom prst="rect">
+            <a:avLst/>
+          </a:prstGeom>
+          <a:noFill/>
+        </p:spPr>
+        <p:txBody>
+          <a:bodyPr wrap="square" rtlCol="0">
+            <a:spAutoFit/>
+          </a:bodyPr>
+          <a:p>
+            <a:r>
+              <a:rPr lang="zh-CN" altLang="en-US"/>
+              <a:t>负责人</a:t>
+            </a:r>
+            <a:r>
+              <a:rPr lang="en-US" altLang="zh-CN"/>
+              <a:t>: </a:t>
+            </a:r>
+            <a:r>
+              <a:rPr lang="zh-CN" altLang="en-US"/>
+              <a:t>崔裕铭</a:t>
+            </a:r>
+            <a:endParaRPr lang="zh-CN" altLang="en-US"/>
+          </a:p>
+        </p:txBody>
+      </p:sp>
+      <p:pic>
+        <p:nvPicPr>
+          <p:cNvPr id="2" name="图片 1"/>
+          <p:cNvPicPr>
+            <a:picLocks noChangeAspect="1"/>
+          </p:cNvPicPr>
+          <p:nvPr/>
+        </p:nvPicPr>
+        <p:blipFill>
+          <a:blip r:embed="rId1"/>
+          <a:stretch>
+            <a:fillRect/>
+          </a:stretch>
+        </p:blipFill>
+        <p:spPr>
+          <a:xfrm>
+            <a:off x="1574800" y="966470"/>
+            <a:ext cx="9042400" cy="4238625"/>
+          </a:xfrm>
+          <a:prstGeom prst="rect">
+            <a:avLst/>
+          </a:prstGeom>
+        </p:spPr>
+      </p:pic>
+    </p:spTree>
+  </p:cSld>
+  <p:clrMapOvr>
+    <a:masterClrMapping/>
+  </p:clrMapOvr>
+</p:sld>
+</file>
+
+<file path=ppt/slides/slide7.xml><?xml version="1.0" encoding="utf-8"?>
+<p:sld xmlns:a="http://schemas.openxmlformats.org/drawingml/2006/main" xmlns:r="http://schemas.openxmlformats.org/officeDocument/2006/relationships" xmlns:p="http://schemas.openxmlformats.org/presentationml/2006/main">
+  <p:cSld>
+    <p:spTree>
+      <p:nvGrpSpPr>
+        <p:cNvPr id="1" name=""/>
+        <p:cNvGrpSpPr/>
+        <p:nvPr/>
+      </p:nvGrpSpPr>
+      <p:grpSpPr/>
+      <p:sp>
+        <p:nvSpPr>
+          <p:cNvPr id="5" name="文本框 4"/>
+          <p:cNvSpPr txBox="1"/>
+          <p:nvPr/>
+        </p:nvSpPr>
+        <p:spPr>
+          <a:xfrm>
+            <a:off x="393065" y="319405"/>
+            <a:ext cx="2282190" cy="460375"/>
+          </a:xfrm>
+          <a:prstGeom prst="rect">
+            <a:avLst/>
+          </a:prstGeom>
+          <a:noFill/>
+        </p:spPr>
+        <p:txBody>
+          <a:bodyPr wrap="square" rtlCol="0">
+            <a:spAutoFit/>
+          </a:bodyPr>
+          <a:p>
+            <a:r>
+              <a:rPr lang="zh-CN" altLang="en-US" sz="2400" b="1"/>
+              <a:t>歌单详情页</a:t>
+            </a:r>
+            <a:endParaRPr lang="zh-CN" altLang="en-US" sz="2400" b="1"/>
+          </a:p>
+        </p:txBody>
+      </p:sp>
+      <p:sp>
+        <p:nvSpPr>
+          <p:cNvPr id="3" name="文本框 2"/>
+          <p:cNvSpPr txBox="1"/>
+          <p:nvPr/>
+        </p:nvSpPr>
+        <p:spPr>
+          <a:xfrm>
+            <a:off x="678815" y="5391150"/>
+            <a:ext cx="5163185" cy="368300"/>
+          </a:xfrm>
+          <a:prstGeom prst="rect">
+            <a:avLst/>
+          </a:prstGeom>
+          <a:noFill/>
+        </p:spPr>
+        <p:txBody>
+          <a:bodyPr wrap="square" rtlCol="0">
+            <a:spAutoFit/>
+          </a:bodyPr>
+          <a:p>
+            <a:r>
+              <a:rPr lang="zh-CN" altLang="en-US"/>
+              <a:t>负责人</a:t>
+            </a:r>
+            <a:r>
+              <a:rPr lang="en-US" altLang="zh-CN"/>
+              <a:t>: </a:t>
+            </a:r>
+            <a:r>
+              <a:rPr lang="zh-CN" altLang="en-US"/>
+              <a:t>崔裕铭</a:t>
+            </a:r>
+            <a:endParaRPr lang="zh-CN" altLang="en-US"/>
+          </a:p>
+        </p:txBody>
+      </p:sp>
+      <p:pic>
+        <p:nvPicPr>
+          <p:cNvPr id="4" name="图片 3"/>
+          <p:cNvPicPr>
+            <a:picLocks noChangeAspect="1"/>
+          </p:cNvPicPr>
+          <p:nvPr/>
+        </p:nvPicPr>
+        <p:blipFill>
+          <a:blip r:embed="rId1"/>
+          <a:stretch>
+            <a:fillRect/>
+          </a:stretch>
+        </p:blipFill>
+        <p:spPr>
+          <a:xfrm>
+            <a:off x="1300480" y="845185"/>
+            <a:ext cx="9590405" cy="4479925"/>
+          </a:xfrm>
+          <a:prstGeom prst="rect">
+            <a:avLst/>
+          </a:prstGeom>
+        </p:spPr>
+      </p:pic>
+    </p:spTree>
+  </p:cSld>
+  <p:clrMapOvr>
+    <a:masterClrMapping/>
+  </p:clrMapOvr>
+</p:sld>
+</file>
+
+<file path=ppt/slides/slide8.xml><?xml version="1.0" encoding="utf-8"?>
+<p:sld xmlns:a="http://schemas.openxmlformats.org/drawingml/2006/main" xmlns:r="http://schemas.openxmlformats.org/officeDocument/2006/relationships" xmlns:p="http://schemas.openxmlformats.org/presentationml/2006/main">
+  <p:cSld>
+    <p:spTree>
+      <p:nvGrpSpPr>
+        <p:cNvPr id="1" name=""/>
+        <p:cNvGrpSpPr/>
+        <p:nvPr/>
+      </p:nvGrpSpPr>
+      <p:grpSpPr/>
+      <p:sp>
+        <p:nvSpPr>
+          <p:cNvPr id="5" name="文本框 4"/>
+          <p:cNvSpPr txBox="1"/>
+          <p:nvPr/>
+        </p:nvSpPr>
+        <p:spPr>
+          <a:xfrm>
+            <a:off x="393065" y="319405"/>
+            <a:ext cx="2282190" cy="460375"/>
+          </a:xfrm>
+          <a:prstGeom prst="rect">
+            <a:avLst/>
+          </a:prstGeom>
+          <a:noFill/>
+        </p:spPr>
+        <p:txBody>
+          <a:bodyPr wrap="square" rtlCol="0">
+            <a:spAutoFit/>
+          </a:bodyPr>
+          <a:p>
+            <a:r>
+              <a:rPr lang="zh-CN" altLang="en-US" sz="2400" b="1"/>
+              <a:t>搜索页</a:t>
+            </a:r>
+            <a:endParaRPr lang="zh-CN" altLang="en-US" sz="2400" b="1"/>
+          </a:p>
+        </p:txBody>
+      </p:sp>
+      <p:sp>
+        <p:nvSpPr>
+          <p:cNvPr id="3" name="文本框 2"/>
+          <p:cNvSpPr txBox="1"/>
+          <p:nvPr/>
+        </p:nvSpPr>
+        <p:spPr>
+          <a:xfrm>
+            <a:off x="678815" y="5391150"/>
+            <a:ext cx="5163185" cy="368300"/>
+          </a:xfrm>
+          <a:prstGeom prst="rect">
+            <a:avLst/>
+          </a:prstGeom>
+          <a:noFill/>
+        </p:spPr>
+        <p:txBody>
+          <a:bodyPr wrap="square" rtlCol="0">
+            <a:spAutoFit/>
+          </a:bodyPr>
+          <a:p>
+            <a:r>
+              <a:rPr lang="zh-CN" altLang="en-US"/>
+              <a:t>负责人</a:t>
+            </a:r>
+            <a:r>
+              <a:rPr lang="en-US" altLang="zh-CN"/>
+              <a:t>: </a:t>
+            </a:r>
+            <a:r>
+              <a:rPr lang="zh-CN" altLang="en-US"/>
+              <a:t>顾璨</a:t>
+            </a:r>
+            <a:endParaRPr lang="zh-CN" altLang="en-US"/>
+          </a:p>
+        </p:txBody>
+      </p:sp>
+    </p:spTree>
+  </p:cSld>
+  <p:clrMapOvr>
+    <a:masterClrMapping/>
+  </p:clrMapOvr>
+</p:sld>
+</file>
+
+<file path=ppt/slides/slide9.xml><?xml version="1.0" encoding="utf-8"?>
+<p:sld xmlns:a="http://schemas.openxmlformats.org/drawingml/2006/main" xmlns:r="http://schemas.openxmlformats.org/officeDocument/2006/relationships" xmlns:p="http://schemas.openxmlformats.org/presentationml/2006/main">
+  <p:cSld>
+    <p:spTree>
+      <p:nvGrpSpPr>
+        <p:cNvPr id="1" name=""/>
+        <p:cNvGrpSpPr/>
+        <p:nvPr/>
+      </p:nvGrpSpPr>
+      <p:grpSpPr/>
+      <p:sp>
+        <p:nvSpPr>
           <p:cNvPr id="2" name="标题 1"/>
           <p:cNvSpPr>
             <a:spLocks noGrp="1"/>
@@ -3174,10 +5625,14 @@
           <a:bodyPr/>
           <a:p>
             <a:r>
-              <a:rPr lang="en-US" altLang="zh-CN"/>
-              <a:t>Thanks!</a:t>
-            </a:r>
-            <a:endParaRPr lang="en-US" altLang="zh-CN"/>
+              <a:rPr lang="zh-CN" altLang="en-US"/>
+              <a:t>项目</a:t>
+            </a:r>
+            <a:r>
+              <a:rPr lang="zh-CN" altLang="en-US"/>
+              <a:t>架构</a:t>
+            </a:r>
+            <a:endParaRPr lang="zh-CN" altLang="en-US"/>
           </a:p>
         </p:txBody>
       </p:sp>

</xml_diff>